<commit_message>
Live demonstration links added
</commit_message>
<xml_diff>
--- a/A-TEAM.pptx
+++ b/A-TEAM.pptx
@@ -8306,7 +8306,7 @@
         <p:spPr>
           <a:xfrm>
             <a:off x="1022684" y="2141621"/>
-            <a:ext cx="3271793" cy="2308324"/>
+            <a:ext cx="8949758" cy="2031325"/>
           </a:xfrm>
           <a:prstGeom prst="rect">
             <a:avLst/>
@@ -8320,116 +8320,57 @@
           <a:lstStyle/>
           <a:p>
             <a:r>
-              <a:rPr lang="en-IN" dirty="0">
-                <a:hlinkClick r:id="rId2"/>
-              </a:rPr>
-              <a:t>https://</a:t>
-            </a:r>
-            <a:r>
-              <a:rPr lang="en-IN" dirty="0" smtClean="0">
-                <a:hlinkClick r:id="rId2"/>
-              </a:rPr>
-              <a:t>youtu.be/XCMhSdcvds4</a:t>
-            </a:r>
-            <a:endParaRPr lang="en-IN" dirty="0" smtClean="0"/>
-          </a:p>
-          <a:p>
-            <a:r>
-              <a:rPr lang="en-IN" dirty="0">
-                <a:hlinkClick r:id="rId3"/>
-              </a:rPr>
-              <a:t>https://</a:t>
-            </a:r>
-            <a:r>
-              <a:rPr lang="en-IN" dirty="0" smtClean="0">
-                <a:hlinkClick r:id="rId3"/>
-              </a:rPr>
-              <a:t>youtu.be/N4Vb_0PdwNA</a:t>
-            </a:r>
-            <a:endParaRPr lang="en-IN" dirty="0" smtClean="0"/>
-          </a:p>
-          <a:p>
-            <a:r>
-              <a:rPr lang="en-IN" dirty="0">
-                <a:hlinkClick r:id="rId4"/>
-              </a:rPr>
-              <a:t>https://</a:t>
-            </a:r>
-            <a:r>
-              <a:rPr lang="en-IN" dirty="0" smtClean="0">
-                <a:hlinkClick r:id="rId4"/>
-              </a:rPr>
-              <a:t>youtu.be/ixBC2fvovlk</a:t>
-            </a:r>
-            <a:endParaRPr lang="en-IN" dirty="0" smtClean="0"/>
-          </a:p>
-          <a:p>
-            <a:r>
-              <a:rPr lang="en-IN" dirty="0">
-                <a:hlinkClick r:id="rId5"/>
-              </a:rPr>
-              <a:t>https://</a:t>
-            </a:r>
-            <a:r>
-              <a:rPr lang="en-IN" dirty="0" smtClean="0">
-                <a:hlinkClick r:id="rId5"/>
-              </a:rPr>
-              <a:t>youtu.be/d_EULxq32Qg</a:t>
-            </a:r>
-            <a:endParaRPr lang="en-IN" dirty="0" smtClean="0"/>
-          </a:p>
-          <a:p>
-            <a:r>
-              <a:rPr lang="en-IN" dirty="0">
-                <a:hlinkClick r:id="rId6"/>
-              </a:rPr>
-              <a:t>https://</a:t>
-            </a:r>
-            <a:r>
-              <a:rPr lang="en-IN" dirty="0" smtClean="0">
-                <a:hlinkClick r:id="rId6"/>
-              </a:rPr>
-              <a:t>youtu.be/JifG3LuMZTw</a:t>
-            </a:r>
-            <a:endParaRPr lang="en-IN" dirty="0" smtClean="0"/>
-          </a:p>
-          <a:p>
-            <a:r>
-              <a:rPr lang="en-IN" dirty="0">
-                <a:hlinkClick r:id="rId7"/>
-              </a:rPr>
-              <a:t>https://</a:t>
-            </a:r>
-            <a:r>
-              <a:rPr lang="en-IN" dirty="0" smtClean="0">
-                <a:hlinkClick r:id="rId7"/>
-              </a:rPr>
-              <a:t>youtu.be/BAR4sJjfxJ8</a:t>
-            </a:r>
-            <a:endParaRPr lang="en-IN" dirty="0" smtClean="0"/>
-          </a:p>
-          <a:p>
-            <a:r>
-              <a:rPr lang="en-IN" dirty="0">
-                <a:hlinkClick r:id="rId8"/>
-              </a:rPr>
-              <a:t>https</a:t>
-            </a:r>
-            <a:r>
-              <a:rPr lang="en-IN">
-                <a:hlinkClick r:id="rId8"/>
-              </a:rPr>
-              <a:t>://</a:t>
-            </a:r>
-            <a:r>
-              <a:rPr lang="en-IN" smtClean="0">
-                <a:hlinkClick r:id="rId8"/>
-              </a:rPr>
-              <a:t>youtu.be/oj9e9ZOr7H8</a:t>
-            </a:r>
-            <a:endParaRPr lang="en-IN" smtClean="0"/>
-          </a:p>
-          <a:p>
+              <a:rPr lang="en-IN" b="1" dirty="0" smtClean="0"/>
+              <a:t>Live Demonstration Available At:</a:t>
+            </a:r>
+          </a:p>
+          <a:p>
+            <a:r>
+              <a:rPr lang="en-IN" dirty="0" smtClean="0"/>
+              <a:t>1</a:t>
+            </a:r>
+            <a:r>
+              <a:rPr lang="en-IN" dirty="0"/>
+              <a:t>.)Beacon implementation : https://youtu.be/XCMhSdcvds4</a:t>
+            </a:r>
+          </a:p>
+          <a:p>
+            <a:r>
+              <a:rPr lang="en-IN" dirty="0"/>
+              <a:t>2.)Chat System : https://youtu.be/N4Vb_0PdwNA</a:t>
+            </a:r>
+          </a:p>
+          <a:p>
+            <a:r>
+              <a:rPr lang="en-IN" dirty="0"/>
+              <a:t>3.)Negotiating with the dealer through </a:t>
+            </a:r>
+            <a:r>
+              <a:rPr lang="en-IN" dirty="0" err="1"/>
+              <a:t>gmail</a:t>
+            </a:r>
+            <a:r>
+              <a:rPr lang="en-IN" dirty="0"/>
+              <a:t> : https://youtu.be/ixBC2fvovlk</a:t>
+            </a:r>
+          </a:p>
+          <a:p>
+            <a:r>
+              <a:rPr lang="en-IN" dirty="0"/>
+              <a:t>4.)View price &amp; Order : https://youtu.be/d_EULxq32Qg</a:t>
+            </a:r>
+          </a:p>
+          <a:p>
+            <a:r>
+              <a:rPr lang="en-IN" dirty="0"/>
+              <a:t>5.)App Tour : https://youtu.be/JifG3LuMZTw</a:t>
+            </a:r>
+          </a:p>
+          <a:p>
+            <a:r>
+              <a:rPr lang="en-IN" dirty="0"/>
+              <a:t>6.)View Retailer location and share product with your friends : https://youtu.be/oj9e9ZOr7H8</a:t>
+            </a:r>
             <a:endParaRPr lang="en-IN" dirty="0"/>
           </a:p>
         </p:txBody>

</xml_diff>